<commit_message>
SQL Server Express Slide
</commit_message>
<xml_diff>
--- a/Documents/From Spreadsheets to Databases.pptx
+++ b/Documents/From Spreadsheets to Databases.pptx
@@ -4821,7 +4821,22 @@
           <a:bodyPr/>
           <a:lstStyle/>
           <a:p>
-            <a:endParaRPr lang="en-US"/>
+            <a:r>
+              <a:rPr lang="en-US" dirty="0"/>
+              <a:t>Microsoft Access</a:t>
+            </a:r>
+          </a:p>
+          <a:p>
+            <a:r>
+              <a:rPr lang="en-US" dirty="0"/>
+              <a:t>Microsoft SQL Server Express</a:t>
+            </a:r>
+          </a:p>
+          <a:p>
+            <a:r>
+              <a:rPr lang="en-US" dirty="0"/>
+              <a:t>Microsoft SQL Server</a:t>
+            </a:r>
           </a:p>
         </p:txBody>
       </p:sp>
@@ -4915,35 +4930,42 @@
             <a:pPr lvl="1"/>
             <a:r>
               <a:rPr lang="en-US" dirty="0"/>
-              <a:t>Pre-installed with the Microsoft Suite (should already be on all the machines) </a:t>
+              <a:t>Pre-installed with the Microsoft Suite (should already be on all the machines).</a:t>
             </a:r>
           </a:p>
           <a:p>
             <a:pPr lvl="1"/>
             <a:r>
               <a:rPr lang="en-US" dirty="0"/>
-              <a:t>Easy to use, basically the database focused version of Excel</a:t>
+              <a:t>Generally used for very basic, small scale databases.</a:t>
+            </a:r>
+          </a:p>
+          <a:p>
+            <a:pPr lvl="1"/>
+            <a:r>
+              <a:rPr lang="en-US" dirty="0"/>
+              <a:t>Easy to use, basically the database focused version of Excel.</a:t>
             </a:r>
           </a:p>
           <a:p>
             <a:pPr lvl="2"/>
             <a:r>
               <a:rPr lang="en-US" dirty="0"/>
-              <a:t>Easy integration/migration with pre-existing Excel tables</a:t>
+              <a:t>Easy integration/migration with pre-existing Excel tables.</a:t>
             </a:r>
           </a:p>
           <a:p>
             <a:pPr lvl="1"/>
             <a:r>
               <a:rPr lang="en-US" dirty="0"/>
-              <a:t>Built in forms, reports, other utilities you can use to easily build own databased</a:t>
+              <a:t>Built in forms, reports, other utilities you can use to easily build own databased.</a:t>
             </a:r>
           </a:p>
           <a:p>
             <a:pPr lvl="1"/>
             <a:r>
               <a:rPr lang="en-US" dirty="0"/>
-              <a:t>Well suited for non-technical users</a:t>
+              <a:t>Well suited for non-technical users.</a:t>
             </a:r>
           </a:p>
           <a:p>
@@ -4956,19 +4978,19 @@
             <a:pPr lvl="1"/>
             <a:r>
               <a:rPr lang="en-US" dirty="0"/>
-              <a:t>Doesn’t support transactional consistency, meaning you can only recover the database to the last full backup </a:t>
+              <a:t>Doesn’t support transactional consistency, meaning you can only recover the database to the last full backup .</a:t>
             </a:r>
           </a:p>
           <a:p>
             <a:r>
               <a:rPr lang="en-US" dirty="0"/>
-              <a:t>Reports: Easy to create a variety of reports through use of “wizards”</a:t>
+              <a:t>Reports: Easy to create a variety of reports through use of “wizards”.</a:t>
             </a:r>
           </a:p>
           <a:p>
             <a:r>
               <a:rPr lang="en-US" dirty="0"/>
-              <a:t>Scalability: Not highly scalable, performance issues arise after more than couple thousands of lines of data or more than a handful of users accessing</a:t>
+              <a:t>Scalability: Not highly scalable, performance issues arise after more than couple thousands of lines of data or more than a handful of users accessing.</a:t>
             </a:r>
           </a:p>
           <a:p>
@@ -5055,30 +5077,73 @@
         </p:nvSpPr>
         <p:spPr/>
         <p:txBody>
-          <a:bodyPr/>
+          <a:bodyPr>
+            <a:normAutofit fontScale="85000" lnSpcReduction="20000"/>
+          </a:bodyPr>
           <a:lstStyle/>
           <a:p>
             <a:r>
               <a:rPr lang="en-US" dirty="0"/>
-              <a:t>Security: </a:t>
-            </a:r>
-          </a:p>
-          <a:p>
+              <a:t>Fast Facts:</a:t>
+            </a:r>
+          </a:p>
+          <a:p>
+            <a:pPr lvl="1"/>
             <a:r>
               <a:rPr lang="en-US" dirty="0"/>
-              <a:t>Reports: </a:t>
-            </a:r>
-          </a:p>
-          <a:p>
+              <a:t>Free to download from Microsoft.</a:t>
+            </a:r>
+          </a:p>
+          <a:p>
+            <a:pPr lvl="1"/>
             <a:r>
               <a:rPr lang="en-US" dirty="0"/>
-              <a:t>Scalability: </a:t>
-            </a:r>
-          </a:p>
-          <a:p>
+              <a:t>Used for small to medium scale applications.</a:t>
+            </a:r>
+          </a:p>
+          <a:p>
+            <a:pPr lvl="1"/>
             <a:r>
               <a:rPr lang="en-US" dirty="0"/>
-              <a:t>Performance: </a:t>
+              <a:t>Requires decent amount of technical ability to implement and manage tables.</a:t>
+            </a:r>
+          </a:p>
+          <a:p>
+            <a:r>
+              <a:rPr lang="en-US" dirty="0"/>
+              <a:t>Security: Very secure</a:t>
+            </a:r>
+          </a:p>
+          <a:p>
+            <a:pPr lvl="1"/>
+            <a:r>
+              <a:rPr lang="en-US" dirty="0"/>
+              <a:t>Transactional consistency, meaning there is a backup and recovery architecture in place so you could recover to any point in the database’s lifetime if necessary.</a:t>
+            </a:r>
+          </a:p>
+          <a:p>
+            <a:r>
+              <a:rPr lang="en-US" dirty="0"/>
+              <a:t>Reports: Requires an additional application to act as user-facing interface for reports.</a:t>
+            </a:r>
+          </a:p>
+          <a:p>
+            <a:r>
+              <a:rPr lang="en-US" dirty="0"/>
+              <a:t>Scalability: Highly scalable, with ability to easily upgrade software later with growing needs. </a:t>
+            </a:r>
+          </a:p>
+          <a:p>
+            <a:pPr lvl="1"/>
+            <a:r>
+              <a:rPr lang="en-US" dirty="0"/>
+              <a:t>Supports essentially an unlimited amount of lines and high amount of concurrent users. </a:t>
+            </a:r>
+          </a:p>
+          <a:p>
+            <a:r>
+              <a:rPr lang="en-US" dirty="0"/>
+              <a:t>Performance: Great, most commonly used enterprise relational database management systems by small to medium sized businesses. </a:t>
             </a:r>
           </a:p>
           <a:p>

</xml_diff>